<commit_message>
Update SDK part two slides
</commit_message>
<xml_diff>
--- a/lectures/powerpoints/SDK-walkthrough-part-two.pptx
+++ b/lectures/powerpoints/SDK-walkthrough-part-two.pptx
@@ -206,7 +206,7 @@
           <a:p>
             <a:fld id="{237A3326-6BE8-4DE2-A526-66D6DC5DC342}" type="datetimeFigureOut">
               <a:rPr lang="en-GB" smtClean="0"/>
-              <a:t>01/05/2024</a:t>
+              <a:t>02/05/2024</a:t>
             </a:fld>
             <a:endParaRPr lang="en-GB"/>
           </a:p>
@@ -383,7 +383,7 @@
           <a:p>
             <a:fld id="{198E9702-0021-4473-93B9-41638846F4C4}" type="datetimeFigureOut">
               <a:rPr lang="en-GB" smtClean="0"/>
-              <a:t>01/05/2024</a:t>
+              <a:t>02/05/2024</a:t>
             </a:fld>
             <a:endParaRPr lang="en-GB"/>
           </a:p>
@@ -979,7 +979,7 @@
           <a:p>
             <a:fld id="{B1836D41-3C4D-1D49-AA54-4231464E6415}" type="datetimeFigureOut">
               <a:rPr lang="en-US" smtClean="0"/>
-              <a:t>5/1/2024</a:t>
+              <a:t>5/2/24</a:t>
             </a:fld>
             <a:endParaRPr lang="en-US"/>
           </a:p>
@@ -1183,7 +1183,7 @@
           <a:p>
             <a:fld id="{B1836D41-3C4D-1D49-AA54-4231464E6415}" type="datetimeFigureOut">
               <a:rPr lang="en-US" smtClean="0"/>
-              <a:t>5/1/2024</a:t>
+              <a:t>5/2/24</a:t>
             </a:fld>
             <a:endParaRPr lang="en-US"/>
           </a:p>
@@ -1364,7 +1364,7 @@
           <a:p>
             <a:fld id="{B1836D41-3C4D-1D49-AA54-4231464E6415}" type="datetimeFigureOut">
               <a:rPr lang="en-US" smtClean="0"/>
-              <a:t>5/1/2024</a:t>
+              <a:t>5/2/24</a:t>
             </a:fld>
             <a:endParaRPr lang="en-US"/>
           </a:p>
@@ -1539,7 +1539,7 @@
           <a:p>
             <a:fld id="{B1836D41-3C4D-1D49-AA54-4231464E6415}" type="datetimeFigureOut">
               <a:rPr lang="en-US" smtClean="0"/>
-              <a:t>5/1/2024</a:t>
+              <a:t>5/2/24</a:t>
             </a:fld>
             <a:endParaRPr lang="en-US"/>
           </a:p>
@@ -1787,7 +1787,7 @@
           <a:p>
             <a:fld id="{B1836D41-3C4D-1D49-AA54-4231464E6415}" type="datetimeFigureOut">
               <a:rPr lang="en-US" smtClean="0"/>
-              <a:t>5/1/2024</a:t>
+              <a:t>5/2/24</a:t>
             </a:fld>
             <a:endParaRPr lang="en-US"/>
           </a:p>
@@ -2104,7 +2104,7 @@
           <a:p>
             <a:fld id="{B1836D41-3C4D-1D49-AA54-4231464E6415}" type="datetimeFigureOut">
               <a:rPr lang="en-US" smtClean="0"/>
-              <a:t>5/1/2024</a:t>
+              <a:t>5/2/24</a:t>
             </a:fld>
             <a:endParaRPr lang="en-US"/>
           </a:p>
@@ -2570,7 +2570,7 @@
           <a:p>
             <a:fld id="{B1836D41-3C4D-1D49-AA54-4231464E6415}" type="datetimeFigureOut">
               <a:rPr lang="en-US" smtClean="0"/>
-              <a:t>5/1/2024</a:t>
+              <a:t>5/2/24</a:t>
             </a:fld>
             <a:endParaRPr lang="en-US"/>
           </a:p>
@@ -2717,7 +2717,7 @@
           <a:p>
             <a:fld id="{B1836D41-3C4D-1D49-AA54-4231464E6415}" type="datetimeFigureOut">
               <a:rPr lang="en-US" smtClean="0"/>
-              <a:t>5/1/2024</a:t>
+              <a:t>5/2/24</a:t>
             </a:fld>
             <a:endParaRPr lang="en-US"/>
           </a:p>
@@ -2807,7 +2807,7 @@
           <a:p>
             <a:fld id="{B1836D41-3C4D-1D49-AA54-4231464E6415}" type="datetimeFigureOut">
               <a:rPr lang="en-US" smtClean="0"/>
-              <a:t>5/1/2024</a:t>
+              <a:t>5/2/24</a:t>
             </a:fld>
             <a:endParaRPr lang="en-US"/>
           </a:p>
@@ -3081,7 +3081,7 @@
           <a:p>
             <a:fld id="{B1836D41-3C4D-1D49-AA54-4231464E6415}" type="datetimeFigureOut">
               <a:rPr lang="en-US" smtClean="0"/>
-              <a:t>5/1/2024</a:t>
+              <a:t>5/2/24</a:t>
             </a:fld>
             <a:endParaRPr lang="en-US"/>
           </a:p>
@@ -3386,7 +3386,7 @@
           <a:p>
             <a:fld id="{B1836D41-3C4D-1D49-AA54-4231464E6415}" type="datetimeFigureOut">
               <a:rPr lang="en-US" smtClean="0"/>
-              <a:t>5/1/2024</a:t>
+              <a:t>5/2/24</a:t>
             </a:fld>
             <a:endParaRPr lang="en-US"/>
           </a:p>
@@ -3683,7 +3683,7 @@
           <a:p>
             <a:fld id="{B1836D41-3C4D-1D49-AA54-4231464E6415}" type="datetimeFigureOut">
               <a:rPr lang="en-US" smtClean="0"/>
-              <a:t>5/1/2024</a:t>
+              <a:t>5/2/24</a:t>
             </a:fld>
             <a:endParaRPr lang="en-US"/>
           </a:p>
@@ -12491,7 +12491,7 @@
           <a:p>
             <a:r>
               <a:rPr lang="en-GB" dirty="0"/>
-              <a:t>Each wavelet has associated with it a 5-bit identify which defines which channel it is communicated on</a:t>
+              <a:t>Each wavelet has associated with it a 5-bit identifier which defines which channel it is communicated on</a:t>
             </a:r>
           </a:p>
           <a:p>
@@ -12619,7 +12619,7 @@
           <a:p>
             <a:r>
               <a:rPr lang="en-GB" dirty="0"/>
-              <a:t>Scaling up to multiple PEs is easy for embarrassingly parallel codes is simple</a:t>
+              <a:t>Scaling up to multiple PEs for embarrassingly parallel codes is simple</a:t>
             </a:r>
           </a:p>
           <a:p>
@@ -15572,7 +15572,7 @@
             </a:r>
             <a:r>
               <a:rPr lang="en-GB" dirty="0"/>
-              <a:t>) each capable of communicating a 32-bit wavelet per cycle</a:t>
+              <a:t>) each capable of communicating a 32-bit wavelet per cycle (router to router)</a:t>
             </a:r>
           </a:p>
         </p:txBody>

</xml_diff>